<commit_message>
Removed debug logging from method: valUsername in class: Validate.
Added configuration for WannaFind.

Updated the mPoint - Cloud Based Mobile Payment diagram to include e-Commerce.

Added screenshots of mPoint's native mobile payment flow for iPhone.

git-svn-id: svn://svn.cellpointmobile.com/mpoint/server/trunk@109 86c063f6-31ef-4d33-b9ba-d2d3e4924f03
</commit_message>
<xml_diff>
--- a/doc/mPoint - Cloud Based Mobile Payment.pptx
+++ b/doc/mPoint - Cloud Based Mobile Payment.pptx
@@ -193,7 +193,7 @@
             <a:fld id="{ADFF7B88-26EB-4FFC-A58B-B49976A7F053}" type="datetimeFigureOut">
               <a:rPr lang="da-DK" smtClean="0"/>
               <a:pPr/>
-              <a:t>07/04/11</a:t>
+              <a:t>04-04-2012</a:t>
             </a:fld>
             <a:endParaRPr lang="en-GB"/>
           </a:p>
@@ -364,7 +364,7 @@
     </p:spTree>
     <p:extLst>
       <p:ext uri="{BB962C8B-B14F-4D97-AF65-F5344CB8AC3E}">
-        <p14:creationId xmlns:p14="http://schemas.microsoft.com/office/powerpoint/2010/main" val="1838641552"/>
+        <p14:creationId xmlns:p14="http://schemas.microsoft.com/office/powerpoint/2010/main" xmlns="" val="1838641552"/>
       </p:ext>
     </p:extLst>
   </p:cSld>
@@ -601,7 +601,7 @@
   <p:timing>
     <p:tnLst>
       <p:par>
-        <p:cTn xmlns:p14="http://schemas.microsoft.com/office/powerpoint/2010/main" id="1" dur="indefinite" restart="never" nodeType="tmRoot"/>
+        <p:cTn id="1" dur="indefinite" restart="never" nodeType="tmRoot"/>
       </p:par>
     </p:tnLst>
   </p:timing>
@@ -1002,7 +1002,7 @@
   <p:timing>
     <p:tnLst>
       <p:par>
-        <p:cTn xmlns:p14="http://schemas.microsoft.com/office/powerpoint/2010/main" id="1" dur="indefinite" restart="never" nodeType="tmRoot"/>
+        <p:cTn id="1" dur="indefinite" restart="never" nodeType="tmRoot"/>
       </p:par>
     </p:tnLst>
   </p:timing>
@@ -1329,7 +1329,7 @@
   <p:timing>
     <p:tnLst>
       <p:par>
-        <p:cTn xmlns:p14="http://schemas.microsoft.com/office/powerpoint/2010/main" id="1" dur="indefinite" restart="never" nodeType="tmRoot"/>
+        <p:cTn id="1" dur="indefinite" restart="never" nodeType="tmRoot"/>
       </p:par>
     </p:tnLst>
   </p:timing>
@@ -1706,7 +1706,7 @@
   <p:timing>
     <p:tnLst>
       <p:par>
-        <p:cTn xmlns:p14="http://schemas.microsoft.com/office/powerpoint/2010/main" id="1" dur="indefinite" restart="never" nodeType="tmRoot"/>
+        <p:cTn id="1" dur="indefinite" restart="never" nodeType="tmRoot"/>
       </p:par>
     </p:tnLst>
   </p:timing>
@@ -2231,7 +2231,7 @@
   <p:timing>
     <p:tnLst>
       <p:par>
-        <p:cTn xmlns:p14="http://schemas.microsoft.com/office/powerpoint/2010/main" id="1" dur="indefinite" restart="never" nodeType="tmRoot"/>
+        <p:cTn id="1" dur="indefinite" restart="never" nodeType="tmRoot"/>
       </p:par>
     </p:tnLst>
   </p:timing>
@@ -2584,7 +2584,7 @@
   <p:timing>
     <p:tnLst>
       <p:par>
-        <p:cTn xmlns:p14="http://schemas.microsoft.com/office/powerpoint/2010/main" id="1" dur="indefinite" restart="never" nodeType="tmRoot"/>
+        <p:cTn id="1" dur="indefinite" restart="never" nodeType="tmRoot"/>
       </p:par>
     </p:tnLst>
   </p:timing>
@@ -2805,7 +2805,7 @@
   <p:timing>
     <p:tnLst>
       <p:par>
-        <p:cTn xmlns:p14="http://schemas.microsoft.com/office/powerpoint/2010/main" id="1" dur="indefinite" restart="never" nodeType="tmRoot"/>
+        <p:cTn id="1" dur="indefinite" restart="never" nodeType="tmRoot"/>
       </p:par>
     </p:tnLst>
   </p:timing>
@@ -2910,7 +2910,7 @@
   <p:timing>
     <p:tnLst>
       <p:par>
-        <p:cTn xmlns:p14="http://schemas.microsoft.com/office/powerpoint/2010/main" id="1" dur="indefinite" restart="never" nodeType="tmRoot"/>
+        <p:cTn id="1" dur="indefinite" restart="never" nodeType="tmRoot"/>
       </p:par>
     </p:tnLst>
   </p:timing>
@@ -3015,7 +3015,7 @@
   <p:timing>
     <p:tnLst>
       <p:par>
-        <p:cTn xmlns:p14="http://schemas.microsoft.com/office/powerpoint/2010/main" id="1" dur="indefinite" restart="never" nodeType="tmRoot"/>
+        <p:cTn id="1" dur="indefinite" restart="never" nodeType="tmRoot"/>
       </p:par>
     </p:tnLst>
   </p:timing>
@@ -3096,7 +3096,7 @@
   <p:timing>
     <p:tnLst>
       <p:par>
-        <p:cTn xmlns:p14="http://schemas.microsoft.com/office/powerpoint/2010/main" id="1" dur="indefinite" restart="never" nodeType="tmRoot"/>
+        <p:cTn id="1" dur="indefinite" restart="never" nodeType="tmRoot"/>
       </p:par>
     </p:tnLst>
   </p:timing>
@@ -3455,7 +3455,7 @@
   <p:timing>
     <p:tnLst>
       <p:par>
-        <p:cTn xmlns:p14="http://schemas.microsoft.com/office/powerpoint/2010/main" id="1" dur="indefinite" restart="never" nodeType="tmRoot"/>
+        <p:cTn id="1" dur="indefinite" restart="never" nodeType="tmRoot"/>
       </p:par>
     </p:tnLst>
   </p:timing>
@@ -3684,7 +3684,7 @@
   <p:timing>
     <p:tnLst>
       <p:par>
-        <p:cTn xmlns:p14="http://schemas.microsoft.com/office/powerpoint/2010/main" id="1" dur="indefinite" restart="never" nodeType="tmRoot"/>
+        <p:cTn id="1" dur="indefinite" restart="never" nodeType="tmRoot"/>
       </p:par>
     </p:tnLst>
   </p:timing>
@@ -3937,7 +3937,7 @@
   <p:timing>
     <p:tnLst>
       <p:par>
-        <p:cTn xmlns:p14="http://schemas.microsoft.com/office/powerpoint/2010/main" id="1" dur="indefinite" restart="never" nodeType="tmRoot"/>
+        <p:cTn id="1" dur="indefinite" restart="never" nodeType="tmRoot"/>
       </p:par>
     </p:tnLst>
   </p:timing>
@@ -4166,7 +4166,7 @@
   <p:timing>
     <p:tnLst>
       <p:par>
-        <p:cTn xmlns:p14="http://schemas.microsoft.com/office/powerpoint/2010/main" id="1" dur="indefinite" restart="never" nodeType="tmRoot"/>
+        <p:cTn id="1" dur="indefinite" restart="never" nodeType="tmRoot"/>
       </p:par>
     </p:tnLst>
   </p:timing>
@@ -4395,7 +4395,7 @@
   <p:timing>
     <p:tnLst>
       <p:par>
-        <p:cTn xmlns:p14="http://schemas.microsoft.com/office/powerpoint/2010/main" id="1" dur="indefinite" restart="never" nodeType="tmRoot"/>
+        <p:cTn id="1" dur="indefinite" restart="never" nodeType="tmRoot"/>
       </p:par>
     </p:tnLst>
   </p:timing>
@@ -4648,7 +4648,7 @@
   <p:timing>
     <p:tnLst>
       <p:par>
-        <p:cTn xmlns:p14="http://schemas.microsoft.com/office/powerpoint/2010/main" id="1" dur="indefinite" restart="never" nodeType="tmRoot"/>
+        <p:cTn id="1" dur="indefinite" restart="never" nodeType="tmRoot"/>
       </p:par>
     </p:tnLst>
   </p:timing>
@@ -4901,7 +4901,7 @@
   <p:timing>
     <p:tnLst>
       <p:par>
-        <p:cTn xmlns:p14="http://schemas.microsoft.com/office/powerpoint/2010/main" id="1" dur="indefinite" restart="never" nodeType="tmRoot"/>
+        <p:cTn id="1" dur="indefinite" restart="never" nodeType="tmRoot"/>
       </p:par>
     </p:tnLst>
   </p:timing>
@@ -5154,7 +5154,7 @@
   <p:timing>
     <p:tnLst>
       <p:par>
-        <p:cTn xmlns:p14="http://schemas.microsoft.com/office/powerpoint/2010/main" id="1" dur="indefinite" restart="never" nodeType="tmRoot"/>
+        <p:cTn id="1" dur="indefinite" restart="never" nodeType="tmRoot"/>
       </p:par>
     </p:tnLst>
   </p:timing>
@@ -5407,7 +5407,7 @@
   <p:timing>
     <p:tnLst>
       <p:par>
-        <p:cTn xmlns:p14="http://schemas.microsoft.com/office/powerpoint/2010/main" id="1" dur="indefinite" restart="never" nodeType="tmRoot"/>
+        <p:cTn id="1" dur="indefinite" restart="never" nodeType="tmRoot"/>
       </p:par>
     </p:tnLst>
   </p:timing>
@@ -5784,7 +5784,7 @@
   <p:timing>
     <p:tnLst>
       <p:par>
-        <p:cTn xmlns:p14="http://schemas.microsoft.com/office/powerpoint/2010/main" id="1" dur="indefinite" restart="never" nodeType="tmRoot"/>
+        <p:cTn id="1" dur="indefinite" restart="never" nodeType="tmRoot"/>
       </p:par>
     </p:tnLst>
   </p:timing>
@@ -5865,7 +5865,7 @@
   <p:timing>
     <p:tnLst>
       <p:par>
-        <p:cTn xmlns:p14="http://schemas.microsoft.com/office/powerpoint/2010/main" id="1" dur="indefinite" restart="never" nodeType="tmRoot"/>
+        <p:cTn id="1" dur="indefinite" restart="never" nodeType="tmRoot"/>
       </p:par>
     </p:tnLst>
   </p:timing>
@@ -6148,10 +6148,10 @@
           <p:nvPr/>
         </p:nvPicPr>
         <p:blipFill>
-          <a:blip r:embed="rId2">
+          <a:blip r:embed="rId2" cstate="print">
             <a:extLst>
               <a:ext uri="{28A0092B-C50C-407E-A947-70E740481C1C}">
-                <a14:useLocalDpi xmlns:a14="http://schemas.microsoft.com/office/drawing/2010/main" val="0"/>
+                <a14:useLocalDpi xmlns:a14="http://schemas.microsoft.com/office/drawing/2010/main" xmlns="" val="0"/>
               </a:ext>
             </a:extLst>
           </a:blip>
@@ -6161,8 +6161,8 @@
         </p:blipFill>
         <p:spPr>
           <a:xfrm>
-            <a:off x="128464" y="4941168"/>
-            <a:ext cx="2622084" cy="1584176"/>
+            <a:off x="1320320" y="5661248"/>
+            <a:ext cx="1430228" cy="864096"/>
           </a:xfrm>
           <a:prstGeom prst="rect">
             <a:avLst/>
@@ -6181,7 +6181,7 @@
           <a:blip r:embed="rId3" cstate="print">
             <a:extLst>
               <a:ext uri="{28A0092B-C50C-407E-A947-70E740481C1C}">
-                <a14:useLocalDpi xmlns:a14="http://schemas.microsoft.com/office/drawing/2010/main"/>
+                <a14:useLocalDpi xmlns:a14="http://schemas.microsoft.com/office/drawing/2010/main" xmlns=""/>
               </a:ext>
             </a:extLst>
           </a:blip>
@@ -6199,35 +6199,6 @@
           </a:prstGeom>
         </p:spPr>
       </p:pic>
-      <p:pic>
-        <p:nvPicPr>
-          <p:cNvPr id="12" name="Picture 11" descr="fundingowners2.png"/>
-          <p:cNvPicPr>
-            <a:picLocks noChangeAspect="1"/>
-          </p:cNvPicPr>
-          <p:nvPr/>
-        </p:nvPicPr>
-        <p:blipFill rotWithShape="1">
-          <a:blip r:embed="rId4" cstate="print">
-            <a:extLst>
-              <a:ext uri="{28A0092B-C50C-407E-A947-70E740481C1C}">
-                <a14:useLocalDpi xmlns:a14="http://schemas.microsoft.com/office/drawing/2010/main"/>
-              </a:ext>
-            </a:extLst>
-          </a:blip>
-          <a:srcRect b="17424"/>
-          <a:stretch/>
-        </p:blipFill>
-        <p:spPr>
-          <a:xfrm>
-            <a:off x="3332820" y="1319754"/>
-            <a:ext cx="3132348" cy="968742"/>
-          </a:xfrm>
-          <a:prstGeom prst="rect">
-            <a:avLst/>
-          </a:prstGeom>
-        </p:spPr>
-      </p:pic>
       <p:sp>
         <p:nvSpPr>
           <p:cNvPr id="27" name="TextBox 26"/>
@@ -6301,10 +6272,10 @@
           <p:nvPr/>
         </p:nvPicPr>
         <p:blipFill>
-          <a:blip r:embed="rId5" cstate="print">
+          <a:blip r:embed="rId4" cstate="print">
             <a:extLst>
               <a:ext uri="{28A0092B-C50C-407E-A947-70E740481C1C}">
-                <a14:useLocalDpi xmlns:a14="http://schemas.microsoft.com/office/drawing/2010/main"/>
+                <a14:useLocalDpi xmlns:a14="http://schemas.microsoft.com/office/drawing/2010/main" xmlns=""/>
               </a:ext>
             </a:extLst>
           </a:blip>
@@ -6316,36 +6287,6 @@
           <a:xfrm>
             <a:off x="5505734" y="2348879"/>
             <a:ext cx="311362" cy="1266199"/>
-          </a:xfrm>
-          <a:prstGeom prst="rect">
-            <a:avLst/>
-          </a:prstGeom>
-        </p:spPr>
-      </p:pic>
-      <p:pic>
-        <p:nvPicPr>
-          <p:cNvPr id="10" name="Picture 9" descr="cloud2.png"/>
-          <p:cNvPicPr>
-            <a:picLocks noChangeAspect="1"/>
-          </p:cNvPicPr>
-          <p:nvPr/>
-        </p:nvPicPr>
-        <p:blipFill>
-          <a:blip r:embed="rId6" cstate="print">
-            <a:extLst>
-              <a:ext uri="{28A0092B-C50C-407E-A947-70E740481C1C}">
-                <a14:useLocalDpi xmlns:a14="http://schemas.microsoft.com/office/drawing/2010/main"/>
-              </a:ext>
-            </a:extLst>
-          </a:blip>
-          <a:stretch>
-            <a:fillRect/>
-          </a:stretch>
-        </p:blipFill>
-        <p:spPr>
-          <a:xfrm>
-            <a:off x="3296816" y="3212976"/>
-            <a:ext cx="3230167" cy="2304256"/>
           </a:xfrm>
           <a:prstGeom prst="rect">
             <a:avLst/>
@@ -6432,50 +6373,6 @@
           </a:p>
         </p:txBody>
       </p:sp>
-      <p:sp>
-        <p:nvSpPr>
-          <p:cNvPr id="53" name="TextBox 52"/>
-          <p:cNvSpPr txBox="1"/>
-          <p:nvPr/>
-        </p:nvSpPr>
-        <p:spPr>
-          <a:xfrm>
-            <a:off x="3836876" y="4725144"/>
-            <a:ext cx="2232248" cy="369332"/>
-          </a:xfrm>
-          <a:prstGeom prst="rect">
-            <a:avLst/>
-          </a:prstGeom>
-          <a:noFill/>
-        </p:spPr>
-        <p:txBody>
-          <a:bodyPr wrap="square" rtlCol="0">
-            <a:spAutoFit/>
-          </a:bodyPr>
-          <a:lstStyle/>
-          <a:p>
-            <a:pPr algn="ctr"/>
-            <a:r>
-              <a:rPr lang="en-GB" b="1" dirty="0" err="1" smtClean="0">
-                <a:latin typeface="Helvetica" pitchFamily="34" charset="0"/>
-                <a:cs typeface="Helvetica" pitchFamily="34" charset="0"/>
-              </a:rPr>
-              <a:t>CellPoint</a:t>
-            </a:r>
-            <a:r>
-              <a:rPr lang="en-GB" b="1" dirty="0" smtClean="0">
-                <a:latin typeface="Helvetica" pitchFamily="34" charset="0"/>
-                <a:cs typeface="Helvetica" pitchFamily="34" charset="0"/>
-              </a:rPr>
-              <a:t> Mobile</a:t>
-            </a:r>
-            <a:endParaRPr lang="en-GB" b="1" dirty="0">
-              <a:latin typeface="Helvetica" pitchFamily="34" charset="0"/>
-              <a:cs typeface="Helvetica" pitchFamily="34" charset="0"/>
-            </a:endParaRPr>
-          </a:p>
-        </p:txBody>
-      </p:sp>
       <p:pic>
         <p:nvPicPr>
           <p:cNvPr id="2" name="Picture 1"/>
@@ -6485,7 +6382,7 @@
           <p:nvPr/>
         </p:nvPicPr>
         <p:blipFill>
-          <a:blip r:embed="rId7" cstate="print"/>
+          <a:blip r:embed="rId5" cstate="print"/>
           <a:stretch>
             <a:fillRect/>
           </a:stretch>
@@ -6586,8 +6483,8 @@
         </p:nvSpPr>
         <p:spPr>
           <a:xfrm>
-            <a:off x="-447600" y="4293096"/>
-            <a:ext cx="3096344" cy="400110"/>
+            <a:off x="272480" y="4293096"/>
+            <a:ext cx="1944216" cy="400110"/>
           </a:xfrm>
           <a:prstGeom prst="rect">
             <a:avLst/>
@@ -6612,8 +6509,31 @@
                 <a:latin typeface="Helvetica" pitchFamily="34" charset="0"/>
                 <a:cs typeface="Helvetica" pitchFamily="34" charset="0"/>
               </a:rPr>
-              <a:t>Point of Sale</a:t>
-            </a:r>
+              <a:t>e</a:t>
+            </a:r>
+            <a:r>
+              <a:rPr lang="en-GB" sz="2000" b="1" dirty="0" smtClean="0">
+                <a:solidFill>
+                  <a:schemeClr val="tx2">
+                    <a:lumMod val="60000"/>
+                    <a:lumOff val="40000"/>
+                  </a:schemeClr>
+                </a:solidFill>
+                <a:latin typeface="Helvetica" pitchFamily="34" charset="0"/>
+                <a:cs typeface="Helvetica" pitchFamily="34" charset="0"/>
+              </a:rPr>
+              <a:t>-Commerce</a:t>
+            </a:r>
+            <a:endParaRPr lang="en-GB" sz="2000" b="1" dirty="0" smtClean="0">
+              <a:solidFill>
+                <a:schemeClr val="tx2">
+                  <a:lumMod val="60000"/>
+                  <a:lumOff val="40000"/>
+                </a:schemeClr>
+              </a:solidFill>
+              <a:latin typeface="Helvetica" pitchFamily="34" charset="0"/>
+              <a:cs typeface="Helvetica" pitchFamily="34" charset="0"/>
+            </a:endParaRPr>
           </a:p>
         </p:txBody>
       </p:sp>
@@ -6740,36 +6660,6 @@
       </p:sp>
       <p:pic>
         <p:nvPicPr>
-          <p:cNvPr id="9" name="Picture 8" descr="mPoint - Basic - no text.jpg"/>
-          <p:cNvPicPr>
-            <a:picLocks noChangeAspect="1"/>
-          </p:cNvPicPr>
-          <p:nvPr/>
-        </p:nvPicPr>
-        <p:blipFill>
-          <a:blip r:embed="rId8" cstate="print">
-            <a:extLst>
-              <a:ext uri="{28A0092B-C50C-407E-A947-70E740481C1C}">
-                <a14:useLocalDpi xmlns:a14="http://schemas.microsoft.com/office/drawing/2010/main"/>
-              </a:ext>
-            </a:extLst>
-          </a:blip>
-          <a:stretch>
-            <a:fillRect/>
-          </a:stretch>
-        </p:blipFill>
-        <p:spPr>
-          <a:xfrm>
-            <a:off x="4412940" y="3717032"/>
-            <a:ext cx="1080120" cy="979676"/>
-          </a:xfrm>
-          <a:prstGeom prst="rect">
-            <a:avLst/>
-          </a:prstGeom>
-        </p:spPr>
-      </p:pic>
-      <p:pic>
-        <p:nvPicPr>
           <p:cNvPr id="40" name="Picture 39" descr="arr-up.png"/>
           <p:cNvPicPr>
             <a:picLocks noChangeAspect="1"/>
@@ -6777,10 +6667,10 @@
           <p:nvPr/>
         </p:nvPicPr>
         <p:blipFill>
-          <a:blip r:embed="rId5" cstate="print">
+          <a:blip r:embed="rId4" cstate="print">
             <a:extLst>
               <a:ext uri="{28A0092B-C50C-407E-A947-70E740481C1C}">
-                <a14:useLocalDpi xmlns:a14="http://schemas.microsoft.com/office/drawing/2010/main"/>
+                <a14:useLocalDpi xmlns:a14="http://schemas.microsoft.com/office/drawing/2010/main" xmlns=""/>
               </a:ext>
             </a:extLst>
           </a:blip>
@@ -6807,10 +6697,10 @@
           <p:nvPr/>
         </p:nvPicPr>
         <p:blipFill>
-          <a:blip r:embed="rId5" cstate="print">
+          <a:blip r:embed="rId4" cstate="print">
             <a:extLst>
               <a:ext uri="{28A0092B-C50C-407E-A947-70E740481C1C}">
-                <a14:useLocalDpi xmlns:a14="http://schemas.microsoft.com/office/drawing/2010/main"/>
+                <a14:useLocalDpi xmlns:a14="http://schemas.microsoft.com/office/drawing/2010/main" xmlns=""/>
               </a:ext>
             </a:extLst>
           </a:blip>
@@ -6840,7 +6730,7 @@
           <a:blip r:embed="rId3" cstate="print">
             <a:extLst>
               <a:ext uri="{28A0092B-C50C-407E-A947-70E740481C1C}">
-                <a14:useLocalDpi xmlns:a14="http://schemas.microsoft.com/office/drawing/2010/main"/>
+                <a14:useLocalDpi xmlns:a14="http://schemas.microsoft.com/office/drawing/2010/main" xmlns=""/>
               </a:ext>
             </a:extLst>
           </a:blip>
@@ -6937,7 +6827,7 @@
           <a:blip r:embed="rId3" cstate="print">
             <a:extLst>
               <a:ext uri="{28A0092B-C50C-407E-A947-70E740481C1C}">
-                <a14:useLocalDpi xmlns:a14="http://schemas.microsoft.com/office/drawing/2010/main"/>
+                <a14:useLocalDpi xmlns:a14="http://schemas.microsoft.com/office/drawing/2010/main" xmlns=""/>
               </a:ext>
             </a:extLst>
           </a:blip>
@@ -7019,10 +6909,410 @@
           </a:p>
         </p:txBody>
       </p:sp>
+      <p:pic>
+        <p:nvPicPr>
+          <p:cNvPr id="26" name="Billede 4" descr="website_design.jpg"/>
+          <p:cNvPicPr>
+            <a:picLocks noChangeAspect="1"/>
+          </p:cNvPicPr>
+          <p:nvPr/>
+        </p:nvPicPr>
+        <p:blipFill>
+          <a:blip r:embed="rId6" cstate="print">
+            <a:clrChange>
+              <a:clrFrom>
+                <a:srgbClr val="FFFFFF"/>
+              </a:clrFrom>
+              <a:clrTo>
+                <a:srgbClr val="FFFFFF">
+                  <a:alpha val="0"/>
+                </a:srgbClr>
+              </a:clrTo>
+            </a:clrChange>
+            <a:extLst>
+              <a:ext uri="{28A0092B-C50C-407E-A947-70E740481C1C}">
+                <a14:useLocalDpi xmlns="" xmlns:a14="http://schemas.microsoft.com/office/drawing/2010/main" val="0"/>
+              </a:ext>
+            </a:extLst>
+          </a:blip>
+          <a:stretch>
+            <a:fillRect/>
+          </a:stretch>
+        </p:blipFill>
+        <p:spPr>
+          <a:xfrm>
+            <a:off x="344488" y="4581128"/>
+            <a:ext cx="1393198" cy="1286029"/>
+          </a:xfrm>
+          <a:prstGeom prst="rect">
+            <a:avLst/>
+          </a:prstGeom>
+        </p:spPr>
+      </p:pic>
+      <p:sp>
+        <p:nvSpPr>
+          <p:cNvPr id="28" name="TextBox 27"/>
+          <p:cNvSpPr txBox="1"/>
+          <p:nvPr/>
+        </p:nvSpPr>
+        <p:spPr>
+          <a:xfrm>
+            <a:off x="2648744" y="6021288"/>
+            <a:ext cx="1800200" cy="400110"/>
+          </a:xfrm>
+          <a:prstGeom prst="rect">
+            <a:avLst/>
+          </a:prstGeom>
+          <a:noFill/>
+        </p:spPr>
+        <p:txBody>
+          <a:bodyPr wrap="square" rtlCol="0">
+            <a:spAutoFit/>
+          </a:bodyPr>
+          <a:lstStyle/>
+          <a:p>
+            <a:r>
+              <a:rPr lang="en-GB" sz="2000" b="1" dirty="0" smtClean="0">
+                <a:solidFill>
+                  <a:schemeClr val="tx2">
+                    <a:lumMod val="60000"/>
+                    <a:lumOff val="40000"/>
+                  </a:schemeClr>
+                </a:solidFill>
+                <a:latin typeface="Helvetica" pitchFamily="34" charset="0"/>
+                <a:cs typeface="Helvetica" pitchFamily="34" charset="0"/>
+              </a:rPr>
+              <a:t>Point of Sale</a:t>
+            </a:r>
+          </a:p>
+        </p:txBody>
+      </p:sp>
+      <p:pic>
+        <p:nvPicPr>
+          <p:cNvPr id="29" name="Bild 48"/>
+          <p:cNvPicPr>
+            <a:picLocks noChangeAspect="1"/>
+          </p:cNvPicPr>
+          <p:nvPr/>
+        </p:nvPicPr>
+        <p:blipFill>
+          <a:blip r:embed="rId7" cstate="print"/>
+          <a:srcRect t="12755" r="15136" b="20276"/>
+          <a:stretch>
+            <a:fillRect/>
+          </a:stretch>
+        </p:blipFill>
+        <p:spPr>
+          <a:xfrm>
+            <a:off x="4376936" y="1340768"/>
+            <a:ext cx="775579" cy="374519"/>
+          </a:xfrm>
+          <a:prstGeom prst="rect">
+            <a:avLst/>
+          </a:prstGeom>
+        </p:spPr>
+      </p:pic>
+      <p:pic>
+        <p:nvPicPr>
+          <p:cNvPr id="30" name="Bild 49"/>
+          <p:cNvPicPr>
+            <a:picLocks noChangeAspect="1"/>
+          </p:cNvPicPr>
+          <p:nvPr/>
+        </p:nvPicPr>
+        <p:blipFill>
+          <a:blip r:embed="rId8" cstate="print"/>
+          <a:stretch>
+            <a:fillRect/>
+          </a:stretch>
+        </p:blipFill>
+        <p:spPr>
+          <a:xfrm>
+            <a:off x="5241032" y="1340768"/>
+            <a:ext cx="459237" cy="423911"/>
+          </a:xfrm>
+          <a:prstGeom prst="rect">
+            <a:avLst/>
+          </a:prstGeom>
+        </p:spPr>
+      </p:pic>
+      <p:pic>
+        <p:nvPicPr>
+          <p:cNvPr id="32" name="Billede 7" descr="paypal-logo.jpg"/>
+          <p:cNvPicPr>
+            <a:picLocks noChangeAspect="1"/>
+          </p:cNvPicPr>
+          <p:nvPr/>
+        </p:nvPicPr>
+        <p:blipFill>
+          <a:blip r:embed="rId9" cstate="print">
+            <a:extLst>
+              <a:ext uri="{28A0092B-C50C-407E-A947-70E740481C1C}">
+                <a14:useLocalDpi xmlns="" xmlns:a14="http://schemas.microsoft.com/office/drawing/2010/main" val="0"/>
+              </a:ext>
+            </a:extLst>
+          </a:blip>
+          <a:stretch>
+            <a:fillRect/>
+          </a:stretch>
+        </p:blipFill>
+        <p:spPr>
+          <a:xfrm>
+            <a:off x="3224808" y="1412776"/>
+            <a:ext cx="1013130" cy="350243"/>
+          </a:xfrm>
+          <a:prstGeom prst="rect">
+            <a:avLst/>
+          </a:prstGeom>
+        </p:spPr>
+      </p:pic>
+      <p:pic>
+        <p:nvPicPr>
+          <p:cNvPr id="35" name="Bild 51"/>
+          <p:cNvPicPr>
+            <a:picLocks noChangeAspect="1"/>
+          </p:cNvPicPr>
+          <p:nvPr/>
+        </p:nvPicPr>
+        <p:blipFill>
+          <a:blip r:embed="rId10" cstate="print"/>
+          <a:srcRect r="41225"/>
+          <a:stretch>
+            <a:fillRect/>
+          </a:stretch>
+        </p:blipFill>
+        <p:spPr>
+          <a:xfrm>
+            <a:off x="4483340" y="1844824"/>
+            <a:ext cx="1117732" cy="356019"/>
+          </a:xfrm>
+          <a:prstGeom prst="rect">
+            <a:avLst/>
+          </a:prstGeom>
+        </p:spPr>
+      </p:pic>
+      <p:pic>
+        <p:nvPicPr>
+          <p:cNvPr id="1026" name="Picture 2"/>
+          <p:cNvPicPr>
+            <a:picLocks noChangeAspect="1" noChangeArrowheads="1"/>
+          </p:cNvPicPr>
+          <p:nvPr/>
+        </p:nvPicPr>
+        <p:blipFill>
+          <a:blip r:embed="rId11" cstate="print"/>
+          <a:srcRect/>
+          <a:stretch>
+            <a:fillRect/>
+          </a:stretch>
+        </p:blipFill>
+        <p:spPr bwMode="auto">
+          <a:xfrm>
+            <a:off x="3224808" y="1844824"/>
+            <a:ext cx="1183978" cy="330912"/>
+          </a:xfrm>
+          <a:prstGeom prst="rect">
+            <a:avLst/>
+          </a:prstGeom>
+          <a:noFill/>
+          <a:ln w="9525">
+            <a:noFill/>
+            <a:miter lim="800000"/>
+            <a:headEnd/>
+            <a:tailEnd/>
+          </a:ln>
+        </p:spPr>
+      </p:pic>
+      <p:pic>
+        <p:nvPicPr>
+          <p:cNvPr id="1027" name="Picture 3"/>
+          <p:cNvPicPr>
+            <a:picLocks noChangeAspect="1" noChangeArrowheads="1"/>
+          </p:cNvPicPr>
+          <p:nvPr/>
+        </p:nvPicPr>
+        <p:blipFill>
+          <a:blip r:embed="rId12" cstate="print"/>
+          <a:srcRect/>
+          <a:stretch>
+            <a:fillRect/>
+          </a:stretch>
+        </p:blipFill>
+        <p:spPr bwMode="auto">
+          <a:xfrm>
+            <a:off x="5745088" y="1340768"/>
+            <a:ext cx="840457" cy="430734"/>
+          </a:xfrm>
+          <a:prstGeom prst="rect">
+            <a:avLst/>
+          </a:prstGeom>
+          <a:noFill/>
+          <a:ln w="9525">
+            <a:noFill/>
+            <a:miter lim="800000"/>
+            <a:headEnd/>
+            <a:tailEnd/>
+          </a:ln>
+        </p:spPr>
+      </p:pic>
+      <p:pic>
+        <p:nvPicPr>
+          <p:cNvPr id="1029" name="Picture 5"/>
+          <p:cNvPicPr>
+            <a:picLocks noChangeAspect="1" noChangeArrowheads="1"/>
+          </p:cNvPicPr>
+          <p:nvPr/>
+        </p:nvPicPr>
+        <p:blipFill>
+          <a:blip r:embed="rId13" cstate="print">
+            <a:clrChange>
+              <a:clrFrom>
+                <a:srgbClr val="000000"/>
+              </a:clrFrom>
+              <a:clrTo>
+                <a:srgbClr val="000000">
+                  <a:alpha val="0"/>
+                </a:srgbClr>
+              </a:clrTo>
+            </a:clrChange>
+          </a:blip>
+          <a:srcRect/>
+          <a:stretch>
+            <a:fillRect/>
+          </a:stretch>
+        </p:blipFill>
+        <p:spPr bwMode="auto">
+          <a:xfrm>
+            <a:off x="5601072" y="1633692"/>
+            <a:ext cx="1115194" cy="787196"/>
+          </a:xfrm>
+          <a:prstGeom prst="rect">
+            <a:avLst/>
+          </a:prstGeom>
+          <a:noFill/>
+          <a:ln w="9525">
+            <a:noFill/>
+            <a:miter lim="800000"/>
+            <a:headEnd/>
+            <a:tailEnd/>
+          </a:ln>
+        </p:spPr>
+      </p:pic>
+      <p:grpSp>
+        <p:nvGrpSpPr>
+          <p:cNvPr id="42" name="Group 41"/>
+          <p:cNvGrpSpPr/>
+          <p:nvPr/>
+        </p:nvGrpSpPr>
+        <p:grpSpPr>
+          <a:xfrm>
+            <a:off x="3484399" y="3645024"/>
+            <a:ext cx="2980769" cy="1917245"/>
+            <a:chOff x="3484399" y="3645024"/>
+            <a:chExt cx="2980769" cy="1917245"/>
+          </a:xfrm>
+        </p:grpSpPr>
+        <p:sp>
+          <p:nvSpPr>
+            <p:cNvPr id="38" name="Wolke 47"/>
+            <p:cNvSpPr>
+              <a:spLocks noChangeAspect="1"/>
+            </p:cNvSpPr>
+            <p:nvPr/>
+          </p:nvSpPr>
+          <p:spPr>
+            <a:xfrm>
+              <a:off x="3484399" y="3645024"/>
+              <a:ext cx="2980769" cy="1917245"/>
+            </a:xfrm>
+            <a:prstGeom prst="cloud">
+              <a:avLst/>
+            </a:prstGeom>
+            <a:gradFill flip="none" rotWithShape="1">
+              <a:gsLst>
+                <a:gs pos="0">
+                  <a:schemeClr val="accent1">
+                    <a:lumMod val="60000"/>
+                    <a:lumOff val="40000"/>
+                  </a:schemeClr>
+                </a:gs>
+                <a:gs pos="100000">
+                  <a:schemeClr val="accent3">
+                    <a:lumMod val="20000"/>
+                    <a:lumOff val="80000"/>
+                  </a:schemeClr>
+                </a:gs>
+              </a:gsLst>
+              <a:lin ang="18900000" scaled="0"/>
+              <a:tileRect/>
+            </a:gradFill>
+            <a:ln>
+              <a:solidFill>
+                <a:schemeClr val="bg1">
+                  <a:lumMod val="95000"/>
+                </a:schemeClr>
+              </a:solidFill>
+            </a:ln>
+            <a:effectLst>
+              <a:outerShdw blurRad="49530" dist="61087" dir="3000000" algn="tl" rotWithShape="0">
+                <a:srgbClr val="000000">
+                  <a:alpha val="35000"/>
+                </a:srgbClr>
+              </a:outerShdw>
+            </a:effectLst>
+          </p:spPr>
+          <p:style>
+            <a:lnRef idx="1">
+              <a:schemeClr val="accent1"/>
+            </a:lnRef>
+            <a:fillRef idx="3">
+              <a:schemeClr val="accent1"/>
+            </a:fillRef>
+            <a:effectRef idx="2">
+              <a:schemeClr val="accent1"/>
+            </a:effectRef>
+            <a:fontRef idx="minor">
+              <a:schemeClr val="lt1"/>
+            </a:fontRef>
+          </p:style>
+          <p:txBody>
+            <a:bodyPr rtlCol="0" anchor="ctr"/>
+            <a:lstStyle/>
+            <a:p>
+              <a:pPr algn="ctr"/>
+              <a:endParaRPr lang="en-GB"/>
+            </a:p>
+          </p:txBody>
+        </p:sp>
+        <p:pic>
+          <p:nvPicPr>
+            <p:cNvPr id="39" name="Picture 38" descr="mPoint Box.png"/>
+            <p:cNvPicPr>
+              <a:picLocks noChangeAspect="1"/>
+            </p:cNvPicPr>
+            <p:nvPr/>
+          </p:nvPicPr>
+          <p:blipFill>
+            <a:blip r:embed="rId14" cstate="print"/>
+            <a:stretch>
+              <a:fillRect/>
+            </a:stretch>
+          </p:blipFill>
+          <p:spPr>
+            <a:xfrm>
+              <a:off x="4681560" y="4005064"/>
+              <a:ext cx="730549" cy="1089629"/>
+            </a:xfrm>
+            <a:prstGeom prst="rect">
+              <a:avLst/>
+            </a:prstGeom>
+          </p:spPr>
+        </p:pic>
+      </p:grpSp>
     </p:spTree>
     <p:extLst>
       <p:ext uri="{BB962C8B-B14F-4D97-AF65-F5344CB8AC3E}">
-        <p14:creationId xmlns:p14="http://schemas.microsoft.com/office/powerpoint/2010/main" val="1089515629"/>
+        <p14:creationId xmlns:p14="http://schemas.microsoft.com/office/powerpoint/2010/main" xmlns="" val="1089515629"/>
       </p:ext>
     </p:extLst>
   </p:cSld>
@@ -7032,7 +7322,7 @@
   <p:timing>
     <p:tnLst>
       <p:par>
-        <p:cTn xmlns:p14="http://schemas.microsoft.com/office/powerpoint/2010/main" id="1" dur="indefinite" restart="never" nodeType="tmRoot">
+        <p:cTn id="1" dur="indefinite" restart="never" nodeType="tmRoot">
           <p:childTnLst>
             <p:seq concurrent="1" nextAc="seek">
               <p:cTn id="2" dur="indefinite" nodeType="mainSeq">

</xml_diff>